<commit_message>
Added new site to "Built with Kraken" section
</commit_message>
<xml_diff>
--- a/Build/Development/made-with-kraken.pptx
+++ b/Build/Development/made-with-kraken.pptx
@@ -15,6 +15,7 @@
     <p:sldId id="262" r:id="rId9"/>
     <p:sldId id="263" r:id="rId10"/>
     <p:sldId id="264" r:id="rId11"/>
+    <p:sldId id="265" r:id="rId12"/>
   </p:sldIdLst>
   <p:sldSz cx="1938338" cy="1087438"/>
   <p:notesSz cx="6858000" cy="9144000"/>
@@ -297,7 +298,7 @@
           <a:p>
             <a:fld id="{34C6AA67-E7EC-BD42-94FC-5443D25F9C23}" type="datetimeFigureOut">
               <a:rPr lang="en-US" smtClean="0"/>
-              <a:t>8/15/13</a:t>
+              <a:t>12/2/13</a:t>
             </a:fld>
             <a:endParaRPr lang="en-US"/>
           </a:p>
@@ -467,7 +468,7 @@
           <a:p>
             <a:fld id="{34C6AA67-E7EC-BD42-94FC-5443D25F9C23}" type="datetimeFigureOut">
               <a:rPr lang="en-US" smtClean="0"/>
-              <a:t>8/15/13</a:t>
+              <a:t>12/2/13</a:t>
             </a:fld>
             <a:endParaRPr lang="en-US"/>
           </a:p>
@@ -647,7 +648,7 @@
           <a:p>
             <a:fld id="{34C6AA67-E7EC-BD42-94FC-5443D25F9C23}" type="datetimeFigureOut">
               <a:rPr lang="en-US" smtClean="0"/>
-              <a:t>8/15/13</a:t>
+              <a:t>12/2/13</a:t>
             </a:fld>
             <a:endParaRPr lang="en-US"/>
           </a:p>
@@ -1243,7 +1244,7 @@
                 <a:latin typeface="Calibri"/>
               </a:rPr>
               <a:pPr/>
-              <a:t>8/15/13</a:t>
+              <a:t>12/2/13</a:t>
             </a:fld>
             <a:endParaRPr lang="en-US">
               <a:solidFill>
@@ -1450,7 +1451,7 @@
                 <a:latin typeface="Calibri"/>
               </a:rPr>
               <a:pPr/>
-              <a:t>8/15/13</a:t>
+              <a:t>12/2/13</a:t>
             </a:fld>
             <a:endParaRPr lang="en-US">
               <a:solidFill>
@@ -1733,7 +1734,7 @@
                 <a:latin typeface="Calibri"/>
               </a:rPr>
               <a:pPr/>
-              <a:t>8/15/13</a:t>
+              <a:t>12/2/13</a:t>
             </a:fld>
             <a:endParaRPr lang="en-US">
               <a:solidFill>
@@ -2058,7 +2059,7 @@
                 <a:latin typeface="Calibri"/>
               </a:rPr>
               <a:pPr/>
-              <a:t>8/15/13</a:t>
+              <a:t>12/2/13</a:t>
             </a:fld>
             <a:endParaRPr lang="en-US">
               <a:solidFill>
@@ -2522,7 +2523,7 @@
                 <a:latin typeface="Calibri"/>
               </a:rPr>
               <a:pPr/>
-              <a:t>8/15/13</a:t>
+              <a:t>12/2/13</a:t>
             </a:fld>
             <a:endParaRPr lang="en-US">
               <a:solidFill>
@@ -2677,7 +2678,7 @@
                 <a:latin typeface="Calibri"/>
               </a:rPr>
               <a:pPr/>
-              <a:t>8/15/13</a:t>
+              <a:t>12/2/13</a:t>
             </a:fld>
             <a:endParaRPr lang="en-US">
               <a:solidFill>
@@ -2809,7 +2810,7 @@
                 <a:latin typeface="Calibri"/>
               </a:rPr>
               <a:pPr/>
-              <a:t>8/15/13</a:t>
+              <a:t>12/2/13</a:t>
             </a:fld>
             <a:endParaRPr lang="en-US">
               <a:solidFill>
@@ -3008,7 +3009,7 @@
           <a:p>
             <a:fld id="{34C6AA67-E7EC-BD42-94FC-5443D25F9C23}" type="datetimeFigureOut">
               <a:rPr lang="en-US" smtClean="0"/>
-              <a:t>8/15/13</a:t>
+              <a:t>12/2/13</a:t>
             </a:fld>
             <a:endParaRPr lang="en-US"/>
           </a:p>
@@ -3293,7 +3294,7 @@
                 <a:latin typeface="Calibri"/>
               </a:rPr>
               <a:pPr/>
-              <a:t>8/15/13</a:t>
+              <a:t>12/2/13</a:t>
             </a:fld>
             <a:endParaRPr lang="en-US">
               <a:solidFill>
@@ -3583,7 +3584,7 @@
                 <a:latin typeface="Calibri"/>
               </a:rPr>
               <a:pPr/>
-              <a:t>8/15/13</a:t>
+              <a:t>12/2/13</a:t>
             </a:fld>
             <a:endParaRPr lang="en-US">
               <a:solidFill>
@@ -3790,7 +3791,7 @@
                 <a:latin typeface="Calibri"/>
               </a:rPr>
               <a:pPr/>
-              <a:t>8/15/13</a:t>
+              <a:t>12/2/13</a:t>
             </a:fld>
             <a:endParaRPr lang="en-US">
               <a:solidFill>
@@ -4007,7 +4008,7 @@
                 <a:latin typeface="Calibri"/>
               </a:rPr>
               <a:pPr/>
-              <a:t>8/15/13</a:t>
+              <a:t>12/2/13</a:t>
             </a:fld>
             <a:endParaRPr lang="en-US">
               <a:solidFill>
@@ -4286,7 +4287,7 @@
                 <a:latin typeface="Calibri"/>
               </a:rPr>
               <a:pPr/>
-              <a:t>8/15/13</a:t>
+              <a:t>12/2/13</a:t>
             </a:fld>
             <a:endParaRPr lang="en-US">
               <a:solidFill>
@@ -4493,7 +4494,7 @@
                 <a:latin typeface="Calibri"/>
               </a:rPr>
               <a:pPr/>
-              <a:t>8/15/13</a:t>
+              <a:t>12/2/13</a:t>
             </a:fld>
             <a:endParaRPr lang="en-US">
               <a:solidFill>
@@ -4776,7 +4777,7 @@
                 <a:latin typeface="Calibri"/>
               </a:rPr>
               <a:pPr/>
-              <a:t>8/15/13</a:t>
+              <a:t>12/2/13</a:t>
             </a:fld>
             <a:endParaRPr lang="en-US">
               <a:solidFill>
@@ -5101,7 +5102,7 @@
                 <a:latin typeface="Calibri"/>
               </a:rPr>
               <a:pPr/>
-              <a:t>8/15/13</a:t>
+              <a:t>12/2/13</a:t>
             </a:fld>
             <a:endParaRPr lang="en-US">
               <a:solidFill>
@@ -5560,7 +5561,7 @@
                 <a:latin typeface="Calibri"/>
               </a:rPr>
               <a:pPr/>
-              <a:t>8/15/13</a:t>
+              <a:t>12/2/13</a:t>
             </a:fld>
             <a:endParaRPr lang="en-US">
               <a:solidFill>
@@ -5715,7 +5716,7 @@
                 <a:latin typeface="Calibri"/>
               </a:rPr>
               <a:pPr/>
-              <a:t>8/15/13</a:t>
+              <a:t>12/2/13</a:t>
             </a:fld>
             <a:endParaRPr lang="en-US">
               <a:solidFill>
@@ -6000,7 +6001,7 @@
           <a:p>
             <a:fld id="{34C6AA67-E7EC-BD42-94FC-5443D25F9C23}" type="datetimeFigureOut">
               <a:rPr lang="en-US" smtClean="0"/>
-              <a:t>8/15/13</a:t>
+              <a:t>12/2/13</a:t>
             </a:fld>
             <a:endParaRPr lang="en-US"/>
           </a:p>
@@ -6103,7 +6104,7 @@
                 <a:latin typeface="Calibri"/>
               </a:rPr>
               <a:pPr/>
-              <a:t>8/15/13</a:t>
+              <a:t>12/2/13</a:t>
             </a:fld>
             <a:endParaRPr lang="en-US">
               <a:solidFill>
@@ -6417,7 +6418,7 @@
                 <a:latin typeface="Calibri"/>
               </a:rPr>
               <a:pPr/>
-              <a:t>8/15/13</a:t>
+              <a:t>12/2/13</a:t>
             </a:fld>
             <a:endParaRPr lang="en-US">
               <a:solidFill>
@@ -6707,7 +6708,7 @@
                 <a:latin typeface="Calibri"/>
               </a:rPr>
               <a:pPr/>
-              <a:t>8/15/13</a:t>
+              <a:t>12/2/13</a:t>
             </a:fld>
             <a:endParaRPr lang="en-US">
               <a:solidFill>
@@ -6914,7 +6915,7 @@
                 <a:latin typeface="Calibri"/>
               </a:rPr>
               <a:pPr/>
-              <a:t>8/15/13</a:t>
+              <a:t>12/2/13</a:t>
             </a:fld>
             <a:endParaRPr lang="en-US">
               <a:solidFill>
@@ -7131,7 +7132,7 @@
                 <a:latin typeface="Calibri"/>
               </a:rPr>
               <a:pPr/>
-              <a:t>8/15/13</a:t>
+              <a:t>12/2/13</a:t>
             </a:fld>
             <a:endParaRPr lang="en-US">
               <a:solidFill>
@@ -7761,7 +7762,7 @@
                 <a:latin typeface="Calibri"/>
               </a:rPr>
               <a:pPr/>
-              <a:t>8/15/13</a:t>
+              <a:t>12/2/13</a:t>
             </a:fld>
             <a:endParaRPr lang="en-US">
               <a:solidFill>
@@ -7968,7 +7969,7 @@
                 <a:latin typeface="Calibri"/>
               </a:rPr>
               <a:pPr/>
-              <a:t>8/15/13</a:t>
+              <a:t>12/2/13</a:t>
             </a:fld>
             <a:endParaRPr lang="en-US">
               <a:solidFill>
@@ -8251,7 +8252,7 @@
                 <a:latin typeface="Calibri"/>
               </a:rPr>
               <a:pPr/>
-              <a:t>8/15/13</a:t>
+              <a:t>12/2/13</a:t>
             </a:fld>
             <a:endParaRPr lang="en-US">
               <a:solidFill>
@@ -8576,7 +8577,7 @@
                 <a:latin typeface="Calibri"/>
               </a:rPr>
               <a:pPr/>
-              <a:t>8/15/13</a:t>
+              <a:t>12/2/13</a:t>
             </a:fld>
             <a:endParaRPr lang="en-US">
               <a:solidFill>
@@ -8893,7 +8894,7 @@
           <a:p>
             <a:fld id="{34C6AA67-E7EC-BD42-94FC-5443D25F9C23}" type="datetimeFigureOut">
               <a:rPr lang="en-US" smtClean="0"/>
-              <a:t>8/15/13</a:t>
+              <a:t>12/2/13</a:t>
             </a:fld>
             <a:endParaRPr lang="en-US"/>
           </a:p>
@@ -9323,7 +9324,7 @@
                 <a:latin typeface="Calibri"/>
               </a:rPr>
               <a:pPr/>
-              <a:t>8/15/13</a:t>
+              <a:t>12/2/13</a:t>
             </a:fld>
             <a:endParaRPr lang="en-US">
               <a:solidFill>
@@ -9478,7 +9479,7 @@
                 <a:latin typeface="Calibri"/>
               </a:rPr>
               <a:pPr/>
-              <a:t>8/15/13</a:t>
+              <a:t>12/2/13</a:t>
             </a:fld>
             <a:endParaRPr lang="en-US">
               <a:solidFill>
@@ -9620,7 +9621,7 @@
                 <a:latin typeface="Calibri"/>
               </a:rPr>
               <a:pPr/>
-              <a:t>8/15/13</a:t>
+              <a:t>12/2/13</a:t>
             </a:fld>
             <a:endParaRPr lang="en-US">
               <a:solidFill>
@@ -9934,7 +9935,7 @@
                 <a:latin typeface="Calibri"/>
               </a:rPr>
               <a:pPr/>
-              <a:t>8/15/13</a:t>
+              <a:t>12/2/13</a:t>
             </a:fld>
             <a:endParaRPr lang="en-US">
               <a:solidFill>
@@ -10224,7 +10225,7 @@
                 <a:latin typeface="Calibri"/>
               </a:rPr>
               <a:pPr/>
-              <a:t>8/15/13</a:t>
+              <a:t>12/2/13</a:t>
             </a:fld>
             <a:endParaRPr lang="en-US">
               <a:solidFill>
@@ -10431,7 +10432,7 @@
                 <a:latin typeface="Calibri"/>
               </a:rPr>
               <a:pPr/>
-              <a:t>8/15/13</a:t>
+              <a:t>12/2/13</a:t>
             </a:fld>
             <a:endParaRPr lang="en-US">
               <a:solidFill>
@@ -10648,7 +10649,7 @@
                 <a:latin typeface="Calibri"/>
               </a:rPr>
               <a:pPr/>
-              <a:t>8/15/13</a:t>
+              <a:t>12/2/13</a:t>
             </a:fld>
             <a:endParaRPr lang="en-US">
               <a:solidFill>
@@ -11450,7 +11451,7 @@
           <a:p>
             <a:fld id="{34C6AA67-E7EC-BD42-94FC-5443D25F9C23}" type="datetimeFigureOut">
               <a:rPr lang="en-US" smtClean="0"/>
-              <a:t>8/15/13</a:t>
+              <a:t>12/2/13</a:t>
             </a:fld>
             <a:endParaRPr lang="en-US"/>
           </a:p>
@@ -11568,7 +11569,7 @@
           <a:p>
             <a:fld id="{34C6AA67-E7EC-BD42-94FC-5443D25F9C23}" type="datetimeFigureOut">
               <a:rPr lang="en-US" smtClean="0"/>
-              <a:t>8/15/13</a:t>
+              <a:t>12/2/13</a:t>
             </a:fld>
             <a:endParaRPr lang="en-US"/>
           </a:p>
@@ -11673,7 +11674,7 @@
           <a:p>
             <a:fld id="{34C6AA67-E7EC-BD42-94FC-5443D25F9C23}" type="datetimeFigureOut">
               <a:rPr lang="en-US" smtClean="0"/>
-              <a:t>8/15/13</a:t>
+              <a:t>12/2/13</a:t>
             </a:fld>
             <a:endParaRPr lang="en-US"/>
           </a:p>
@@ -11950,7 +11951,7 @@
           <a:p>
             <a:fld id="{34C6AA67-E7EC-BD42-94FC-5443D25F9C23}" type="datetimeFigureOut">
               <a:rPr lang="en-US" smtClean="0"/>
-              <a:t>8/15/13</a:t>
+              <a:t>12/2/13</a:t>
             </a:fld>
             <a:endParaRPr lang="en-US"/>
           </a:p>
@@ -12203,7 +12204,7 @@
           <a:p>
             <a:fld id="{34C6AA67-E7EC-BD42-94FC-5443D25F9C23}" type="datetimeFigureOut">
               <a:rPr lang="en-US" smtClean="0"/>
-              <a:t>8/15/13</a:t>
+              <a:t>12/2/13</a:t>
             </a:fld>
             <a:endParaRPr lang="en-US"/>
           </a:p>
@@ -12416,7 +12417,7 @@
           <a:p>
             <a:fld id="{34C6AA67-E7EC-BD42-94FC-5443D25F9C23}" type="datetimeFigureOut">
               <a:rPr lang="en-US" smtClean="0"/>
-              <a:t>8/15/13</a:t>
+              <a:t>12/2/13</a:t>
             </a:fld>
             <a:endParaRPr lang="en-US"/>
           </a:p>
@@ -12949,7 +12950,7 @@
                 <a:latin typeface="Calibri"/>
               </a:rPr>
               <a:pPr defTabSz="86263"/>
-              <a:t>8/15/13</a:t>
+              <a:t>12/2/13</a:t>
             </a:fld>
             <a:endParaRPr lang="en-US">
               <a:solidFill>
@@ -13498,7 +13499,7 @@
                 <a:latin typeface="Calibri"/>
               </a:rPr>
               <a:pPr/>
-              <a:t>8/15/13</a:t>
+              <a:t>12/2/13</a:t>
             </a:fld>
             <a:endParaRPr lang="en-US">
               <a:solidFill>
@@ -14056,7 +14057,7 @@
                 <a:latin typeface="Calibri"/>
               </a:rPr>
               <a:pPr/>
-              <a:t>8/15/13</a:t>
+              <a:t>12/2/13</a:t>
             </a:fld>
             <a:endParaRPr lang="en-US">
               <a:solidFill>
@@ -15393,6 +15394,124 @@
   <p:clrMapOvr>
     <a:masterClrMapping/>
   </p:clrMapOvr>
+</p:sld>
+</file>
+
+<file path=ppt/slides/slide8.xml><?xml version="1.0" encoding="utf-8"?>
+<p:sld xmlns:a="http://schemas.openxmlformats.org/drawingml/2006/main" xmlns:r="http://schemas.openxmlformats.org/officeDocument/2006/relationships" xmlns:p="http://schemas.openxmlformats.org/presentationml/2006/main">
+  <p:cSld>
+    <p:spTree>
+      <p:nvGrpSpPr>
+        <p:cNvPr id="1" name=""/>
+        <p:cNvGrpSpPr/>
+        <p:nvPr/>
+      </p:nvGrpSpPr>
+      <p:grpSpPr>
+        <a:xfrm>
+          <a:off x="0" y="0"/>
+          <a:ext cx="0" cy="0"/>
+          <a:chOff x="0" y="0"/>
+          <a:chExt cx="0" cy="0"/>
+        </a:xfrm>
+      </p:grpSpPr>
+      <p:sp>
+        <p:nvSpPr>
+          <p:cNvPr id="11" name="Rectangle 10"/>
+          <p:cNvSpPr/>
+          <p:nvPr/>
+        </p:nvSpPr>
+        <p:spPr>
+          <a:xfrm>
+            <a:off x="0" y="0"/>
+            <a:ext cx="1938338" cy="1087438"/>
+          </a:xfrm>
+          <a:prstGeom prst="rect">
+            <a:avLst/>
+          </a:prstGeom>
+          <a:noFill/>
+          <a:ln w="12700" cmpd="sng">
+            <a:solidFill>
+              <a:schemeClr val="tx1">
+                <a:lumMod val="65000"/>
+                <a:lumOff val="35000"/>
+              </a:schemeClr>
+            </a:solidFill>
+          </a:ln>
+          <a:effectLst/>
+        </p:spPr>
+        <p:style>
+          <a:lnRef idx="1">
+            <a:schemeClr val="accent1"/>
+          </a:lnRef>
+          <a:fillRef idx="3">
+            <a:schemeClr val="accent1"/>
+          </a:fillRef>
+          <a:effectRef idx="2">
+            <a:schemeClr val="accent1"/>
+          </a:effectRef>
+          <a:fontRef idx="minor">
+            <a:schemeClr val="lt1"/>
+          </a:fontRef>
+        </p:style>
+        <p:txBody>
+          <a:bodyPr lIns="19330" tIns="9663" rIns="19330" bIns="9663" rtlCol="0" anchor="ctr"/>
+          <a:lstStyle/>
+          <a:p>
+            <a:pPr algn="ctr"/>
+            <a:endParaRPr lang="en-US"/>
+          </a:p>
+        </p:txBody>
+      </p:sp>
+      <p:pic>
+        <p:nvPicPr>
+          <p:cNvPr id="2" name="Picture 1" descr="header-letterhead-email.png"/>
+          <p:cNvPicPr>
+            <a:picLocks noChangeAspect="1"/>
+          </p:cNvPicPr>
+          <p:nvPr/>
+        </p:nvPicPr>
+        <p:blipFill>
+          <a:blip r:embed="rId2">
+            <a:extLst>
+              <a:ext uri="{28A0092B-C50C-407E-A947-70E740481C1C}">
+                <a14:useLocalDpi xmlns:a14="http://schemas.microsoft.com/office/drawing/2010/main" val="0"/>
+              </a:ext>
+            </a:extLst>
+          </a:blip>
+          <a:stretch>
+            <a:fillRect/>
+          </a:stretch>
+        </p:blipFill>
+        <p:spPr>
+          <a:xfrm>
+            <a:off x="84138" y="325288"/>
+            <a:ext cx="1770062" cy="431022"/>
+          </a:xfrm>
+          <a:prstGeom prst="rect">
+            <a:avLst/>
+          </a:prstGeom>
+        </p:spPr>
+      </p:pic>
+    </p:spTree>
+    <p:extLst>
+      <p:ext uri="{BB962C8B-B14F-4D97-AF65-F5344CB8AC3E}">
+        <p14:creationId xmlns:p14="http://schemas.microsoft.com/office/powerpoint/2010/main" val="1059043742"/>
+      </p:ext>
+    </p:extLst>
+  </p:cSld>
+  <p:clrMapOvr>
+    <a:masterClrMapping/>
+  </p:clrMapOvr>
+  <p:transition xmlns:p14="http://schemas.microsoft.com/office/powerpoint/2010/main">
+    <p:fade/>
+  </p:transition>
+  <p:timing>
+    <p:tnLst>
+      <p:par>
+        <p:cTn xmlns:p14="http://schemas.microsoft.com/office/powerpoint/2010/main" id="1" dur="indefinite" restart="never" nodeType="tmRoot"/>
+      </p:par>
+    </p:tnLst>
+  </p:timing>
 </p:sld>
 </file>
 

</xml_diff>